<commit_message>
version 1.5.2 updated ReadMe
</commit_message>
<xml_diff>
--- a/Corey/Corey_slide.pptx
+++ b/Corey/Corey_slide.pptx
@@ -107,6 +107,11 @@
       </a:defRPr>
     </a:lvl9pPr>
   </p:defaultTextStyle>
+  <p:extLst>
+    <p:ext uri="{EFAFB233-063F-42B5-8137-9DF3F51BA10A}">
+      <p15:sldGuideLst xmlns:p15="http://schemas.microsoft.com/office/powerpoint/2012/main"/>
+    </p:ext>
+  </p:extLst>
 </p:presentation>
 </file>
 
@@ -3379,6 +3384,37 @@
             </a:r>
           </a:p>
           <a:p>
+            <a:r>
+              <a:rPr lang="en-US" dirty="0"/>
+              <a:t>Think of it as a function y = f(x1,x2,x..n) </a:t>
+            </a:r>
+          </a:p>
+          <a:p>
+            <a:r>
+              <a:rPr lang="en-US" dirty="0"/>
+              <a:t>Where y = slope1(x1) + slope2(x2) + </a:t>
+            </a:r>
+            <a:r>
+              <a:rPr lang="en-US" dirty="0" err="1"/>
+              <a:t>slopeN</a:t>
+            </a:r>
+            <a:r>
+              <a:rPr lang="en-US" dirty="0"/>
+              <a:t>(</a:t>
+            </a:r>
+            <a:r>
+              <a:rPr lang="en-US" dirty="0" err="1"/>
+              <a:t>xn</a:t>
+            </a:r>
+            <a:r>
+              <a:rPr lang="en-US" dirty="0"/>
+              <a:t>) + constant or y intercept</a:t>
+            </a:r>
+          </a:p>
+          <a:p>
+            <a:endParaRPr lang="en-US" dirty="0"/>
+          </a:p>
+          <a:p>
             <a:endParaRPr lang="en-US" dirty="0"/>
           </a:p>
         </p:txBody>
@@ -3470,7 +3506,7 @@
           <a:p>
             <a:r>
               <a:rPr lang="en-US" dirty="0"/>
-              <a:t>From there we could use this model as a “data driven” method to inform people to stop smoking, make healthy decisions about their body, and teach their children to never start using tobacco and smoke anything.</a:t>
+              <a:t>From there we could use this model as a “data driven” method to inform people to stop smoking, make healthy decisions about their body, and teach their children to never start using tobacco and smoke anything due to a financial penalty.</a:t>
             </a:r>
           </a:p>
         </p:txBody>
@@ -3599,8 +3635,12 @@
               <a:t>jupyter</a:t>
             </a:r>
             <a:r>
+              <a:rPr lang="en-US"/>
+              <a:t> notebooks </a:t>
+            </a:r>
+            <a:r>
               <a:rPr lang="en-US" dirty="0"/>
-              <a:t> notebook to use a supervised Machine learning algorithm within a multivariant linear regression to predict our future health care costs</a:t>
+              <a:t>to use a supervised Machine learning algorithm within a multivariant linear regression to predict our future health care costs</a:t>
             </a:r>
           </a:p>
           <a:p>

</xml_diff>